<commit_message>
Add best model option
</commit_message>
<xml_diff>
--- a/documents/Real-time Quicknets.pptx
+++ b/documents/Real-time Quicknets.pptx
@@ -5,7 +5,7 @@
     <p:sldMasterId id="2147483648" r:id="rId1"/>
   </p:sldMasterIdLst>
   <p:notesMasterIdLst>
-    <p:notesMasterId r:id="rId24"/>
+    <p:notesMasterId r:id="rId29"/>
   </p:notesMasterIdLst>
   <p:sldIdLst>
     <p:sldId id="256" r:id="rId2"/>
@@ -30,6 +30,11 @@
     <p:sldId id="277" r:id="rId21"/>
     <p:sldId id="279" r:id="rId22"/>
     <p:sldId id="278" r:id="rId23"/>
+    <p:sldId id="282" r:id="rId24"/>
+    <p:sldId id="280" r:id="rId25"/>
+    <p:sldId id="283" r:id="rId26"/>
+    <p:sldId id="284" r:id="rId27"/>
+    <p:sldId id="285" r:id="rId28"/>
   </p:sldIdLst>
   <p:sldSz cx="12192000" cy="6858000"/>
   <p:notesSz cx="6858000" cy="9144000"/>
@@ -218,7 +223,7 @@
           <a:p>
             <a:fld id="{93D201DA-95C4-AD47-B102-389777227850}" type="datetimeFigureOut">
               <a:rPr lang="en-US" smtClean="0"/>
-              <a:t>11/10/2021</a:t>
+              <a:t>12/20/21</a:t>
             </a:fld>
             <a:endParaRPr lang="en-US"/>
           </a:p>
@@ -968,7 +973,7 @@
           <a:p>
             <a:fld id="{DE016FBE-F546-1A47-B8E5-1361F3BA1840}" type="datetimeFigureOut">
               <a:rPr lang="en-US" smtClean="0"/>
-              <a:t>11/10/2021</a:t>
+              <a:t>12/20/21</a:t>
             </a:fld>
             <a:endParaRPr lang="en-US"/>
           </a:p>
@@ -1166,7 +1171,7 @@
           <a:p>
             <a:fld id="{DE016FBE-F546-1A47-B8E5-1361F3BA1840}" type="datetimeFigureOut">
               <a:rPr lang="en-US" smtClean="0"/>
-              <a:t>11/10/2021</a:t>
+              <a:t>12/20/21</a:t>
             </a:fld>
             <a:endParaRPr lang="en-US"/>
           </a:p>
@@ -1374,7 +1379,7 @@
           <a:p>
             <a:fld id="{DE016FBE-F546-1A47-B8E5-1361F3BA1840}" type="datetimeFigureOut">
               <a:rPr lang="en-US" smtClean="0"/>
-              <a:t>11/10/2021</a:t>
+              <a:t>12/20/21</a:t>
             </a:fld>
             <a:endParaRPr lang="en-US"/>
           </a:p>
@@ -1598,7 +1603,7 @@
           <a:p>
             <a:fld id="{DE016FBE-F546-1A47-B8E5-1361F3BA1840}" type="datetimeFigureOut">
               <a:rPr lang="en-US" smtClean="0"/>
-              <a:t>11/10/2021</a:t>
+              <a:t>12/20/21</a:t>
             </a:fld>
             <a:endParaRPr lang="en-US"/>
           </a:p>
@@ -1873,7 +1878,7 @@
           <a:p>
             <a:fld id="{DE016FBE-F546-1A47-B8E5-1361F3BA1840}" type="datetimeFigureOut">
               <a:rPr lang="en-US" smtClean="0"/>
-              <a:t>11/10/2021</a:t>
+              <a:t>12/20/21</a:t>
             </a:fld>
             <a:endParaRPr lang="en-US"/>
           </a:p>
@@ -2138,7 +2143,7 @@
           <a:p>
             <a:fld id="{DE016FBE-F546-1A47-B8E5-1361F3BA1840}" type="datetimeFigureOut">
               <a:rPr lang="en-US" smtClean="0"/>
-              <a:t>11/10/2021</a:t>
+              <a:t>12/20/21</a:t>
             </a:fld>
             <a:endParaRPr lang="en-US"/>
           </a:p>
@@ -2550,7 +2555,7 @@
           <a:p>
             <a:fld id="{DE016FBE-F546-1A47-B8E5-1361F3BA1840}" type="datetimeFigureOut">
               <a:rPr lang="en-US" smtClean="0"/>
-              <a:t>11/10/2021</a:t>
+              <a:t>12/20/21</a:t>
             </a:fld>
             <a:endParaRPr lang="en-US"/>
           </a:p>
@@ -2691,7 +2696,7 @@
           <a:p>
             <a:fld id="{DE016FBE-F546-1A47-B8E5-1361F3BA1840}" type="datetimeFigureOut">
               <a:rPr lang="en-US" smtClean="0"/>
-              <a:t>11/10/2021</a:t>
+              <a:t>12/20/21</a:t>
             </a:fld>
             <a:endParaRPr lang="en-US"/>
           </a:p>
@@ -2804,7 +2809,7 @@
           <a:p>
             <a:fld id="{DE016FBE-F546-1A47-B8E5-1361F3BA1840}" type="datetimeFigureOut">
               <a:rPr lang="en-US" smtClean="0"/>
-              <a:t>11/10/2021</a:t>
+              <a:t>12/20/21</a:t>
             </a:fld>
             <a:endParaRPr lang="en-US"/>
           </a:p>
@@ -3115,7 +3120,7 @@
           <a:p>
             <a:fld id="{DE016FBE-F546-1A47-B8E5-1361F3BA1840}" type="datetimeFigureOut">
               <a:rPr lang="en-US" smtClean="0"/>
-              <a:t>11/10/2021</a:t>
+              <a:t>12/20/21</a:t>
             </a:fld>
             <a:endParaRPr lang="en-US"/>
           </a:p>
@@ -3403,7 +3408,7 @@
           <a:p>
             <a:fld id="{DE016FBE-F546-1A47-B8E5-1361F3BA1840}" type="datetimeFigureOut">
               <a:rPr lang="en-US" smtClean="0"/>
-              <a:t>11/10/2021</a:t>
+              <a:t>12/20/21</a:t>
             </a:fld>
             <a:endParaRPr lang="en-US"/>
           </a:p>
@@ -3644,7 +3649,7 @@
           <a:p>
             <a:fld id="{DE016FBE-F546-1A47-B8E5-1361F3BA1840}" type="datetimeFigureOut">
               <a:rPr lang="en-US" smtClean="0"/>
-              <a:t>11/10/2021</a:t>
+              <a:t>12/20/21</a:t>
             </a:fld>
             <a:endParaRPr lang="en-US"/>
           </a:p>
@@ -9958,6 +9963,781 @@
 </p:sld>
 </file>
 
+<file path=ppt/slides/slide23.xml><?xml version="1.0" encoding="utf-8"?>
+<p:sld xmlns:a="http://schemas.openxmlformats.org/drawingml/2006/main" xmlns:r="http://schemas.openxmlformats.org/officeDocument/2006/relationships" xmlns:p="http://schemas.openxmlformats.org/presentationml/2006/main">
+  <p:cSld>
+    <p:spTree>
+      <p:nvGrpSpPr>
+        <p:cNvPr id="1" name=""/>
+        <p:cNvGrpSpPr/>
+        <p:nvPr/>
+      </p:nvGrpSpPr>
+      <p:grpSpPr>
+        <a:xfrm>
+          <a:off x="0" y="0"/>
+          <a:ext cx="0" cy="0"/>
+          <a:chOff x="0" y="0"/>
+          <a:chExt cx="0" cy="0"/>
+        </a:xfrm>
+      </p:grpSpPr>
+      <p:pic>
+        <p:nvPicPr>
+          <p:cNvPr id="5" name="Picture 4" descr="Chart, treemap chart&#10;&#10;Description automatically generated">
+            <a:extLst>
+              <a:ext uri="{FF2B5EF4-FFF2-40B4-BE49-F238E27FC236}">
+                <a16:creationId xmlns:a16="http://schemas.microsoft.com/office/drawing/2014/main" id="{7956547C-5E06-104B-B483-C5C3DE3FCC62}"/>
+              </a:ext>
+            </a:extLst>
+          </p:cNvPr>
+          <p:cNvPicPr>
+            <a:picLocks noChangeAspect="1"/>
+          </p:cNvPicPr>
+          <p:nvPr/>
+        </p:nvPicPr>
+        <p:blipFill>
+          <a:blip r:embed="rId2"/>
+          <a:stretch>
+            <a:fillRect/>
+          </a:stretch>
+        </p:blipFill>
+        <p:spPr>
+          <a:xfrm>
+            <a:off x="1290501" y="0"/>
+            <a:ext cx="9610997" cy="6858000"/>
+          </a:xfrm>
+          <a:prstGeom prst="rect">
+            <a:avLst/>
+          </a:prstGeom>
+        </p:spPr>
+      </p:pic>
+      <p:pic>
+        <p:nvPicPr>
+          <p:cNvPr id="7" name="Picture 6" descr="Table&#10;&#10;Description automatically generated">
+            <a:extLst>
+              <a:ext uri="{FF2B5EF4-FFF2-40B4-BE49-F238E27FC236}">
+                <a16:creationId xmlns:a16="http://schemas.microsoft.com/office/drawing/2014/main" id="{D7F56CF8-7AE0-9F4A-A3FB-B05DA4004E9A}"/>
+              </a:ext>
+            </a:extLst>
+          </p:cNvPr>
+          <p:cNvPicPr>
+            <a:picLocks noChangeAspect="1"/>
+          </p:cNvPicPr>
+          <p:nvPr/>
+        </p:nvPicPr>
+        <p:blipFill>
+          <a:blip r:embed="rId3"/>
+          <a:stretch>
+            <a:fillRect/>
+          </a:stretch>
+        </p:blipFill>
+        <p:spPr>
+          <a:xfrm>
+            <a:off x="1290501" y="0"/>
+            <a:ext cx="9610997" cy="6858000"/>
+          </a:xfrm>
+          <a:prstGeom prst="rect">
+            <a:avLst/>
+          </a:prstGeom>
+        </p:spPr>
+      </p:pic>
+      <p:pic>
+        <p:nvPicPr>
+          <p:cNvPr id="9" name="Picture 8" descr="Chart, treemap chart&#10;&#10;Description automatically generated">
+            <a:extLst>
+              <a:ext uri="{FF2B5EF4-FFF2-40B4-BE49-F238E27FC236}">
+                <a16:creationId xmlns:a16="http://schemas.microsoft.com/office/drawing/2014/main" id="{EC32C42F-C372-EC42-B19C-0DAD026CBBAF}"/>
+              </a:ext>
+            </a:extLst>
+          </p:cNvPr>
+          <p:cNvPicPr>
+            <a:picLocks noChangeAspect="1"/>
+          </p:cNvPicPr>
+          <p:nvPr/>
+        </p:nvPicPr>
+        <p:blipFill>
+          <a:blip r:embed="rId4"/>
+          <a:stretch>
+            <a:fillRect/>
+          </a:stretch>
+        </p:blipFill>
+        <p:spPr>
+          <a:xfrm>
+            <a:off x="1290501" y="0"/>
+            <a:ext cx="9610997" cy="6858000"/>
+          </a:xfrm>
+          <a:prstGeom prst="rect">
+            <a:avLst/>
+          </a:prstGeom>
+        </p:spPr>
+      </p:pic>
+      <p:pic>
+        <p:nvPicPr>
+          <p:cNvPr id="11" name="Picture 10" descr="Table&#10;&#10;Description automatically generated">
+            <a:extLst>
+              <a:ext uri="{FF2B5EF4-FFF2-40B4-BE49-F238E27FC236}">
+                <a16:creationId xmlns:a16="http://schemas.microsoft.com/office/drawing/2014/main" id="{896110A1-ECD7-1F4C-BA4D-2FB51265BDAB}"/>
+              </a:ext>
+            </a:extLst>
+          </p:cNvPr>
+          <p:cNvPicPr>
+            <a:picLocks noChangeAspect="1"/>
+          </p:cNvPicPr>
+          <p:nvPr/>
+        </p:nvPicPr>
+        <p:blipFill>
+          <a:blip r:embed="rId5"/>
+          <a:stretch>
+            <a:fillRect/>
+          </a:stretch>
+        </p:blipFill>
+        <p:spPr>
+          <a:xfrm>
+            <a:off x="1290501" y="0"/>
+            <a:ext cx="9610997" cy="6858000"/>
+          </a:xfrm>
+          <a:prstGeom prst="rect">
+            <a:avLst/>
+          </a:prstGeom>
+        </p:spPr>
+      </p:pic>
+      <p:sp>
+        <p:nvSpPr>
+          <p:cNvPr id="14" name="TextBox 13">
+            <a:extLst>
+              <a:ext uri="{FF2B5EF4-FFF2-40B4-BE49-F238E27FC236}">
+                <a16:creationId xmlns:a16="http://schemas.microsoft.com/office/drawing/2014/main" id="{C0DA6E22-CC94-FB48-86CA-9B77C6622753}"/>
+              </a:ext>
+            </a:extLst>
+          </p:cNvPr>
+          <p:cNvSpPr txBox="1"/>
+          <p:nvPr/>
+        </p:nvSpPr>
+        <p:spPr>
+          <a:xfrm>
+            <a:off x="2588964" y="121186"/>
+            <a:ext cx="7755875" cy="369332"/>
+          </a:xfrm>
+          <a:prstGeom prst="rect">
+            <a:avLst/>
+          </a:prstGeom>
+          <a:noFill/>
+        </p:spPr>
+        <p:txBody>
+          <a:bodyPr wrap="square" rtlCol="0">
+            <a:spAutoFit/>
+          </a:bodyPr>
+          <a:lstStyle/>
+          <a:p>
+            <a:r>
+              <a:rPr lang="en-US" dirty="0"/>
+              <a:t>InvertedPendulum-V2 Reward / Survival time in seconds</a:t>
+            </a:r>
+          </a:p>
+        </p:txBody>
+      </p:sp>
+    </p:spTree>
+    <p:extLst>
+      <p:ext uri="{BB962C8B-B14F-4D97-AF65-F5344CB8AC3E}">
+        <p14:creationId xmlns:p14="http://schemas.microsoft.com/office/powerpoint/2010/main" val="2345248020"/>
+      </p:ext>
+    </p:extLst>
+  </p:cSld>
+  <p:clrMapOvr>
+    <a:masterClrMapping/>
+  </p:clrMapOvr>
+</p:sld>
+</file>
+
+<file path=ppt/slides/slide24.xml><?xml version="1.0" encoding="utf-8"?>
+<p:sld xmlns:a="http://schemas.openxmlformats.org/drawingml/2006/main" xmlns:r="http://schemas.openxmlformats.org/officeDocument/2006/relationships" xmlns:p="http://schemas.openxmlformats.org/presentationml/2006/main">
+  <p:cSld>
+    <p:spTree>
+      <p:nvGrpSpPr>
+        <p:cNvPr id="1" name=""/>
+        <p:cNvGrpSpPr/>
+        <p:nvPr/>
+      </p:nvGrpSpPr>
+      <p:grpSpPr>
+        <a:xfrm>
+          <a:off x="0" y="0"/>
+          <a:ext cx="0" cy="0"/>
+          <a:chOff x="0" y="0"/>
+          <a:chExt cx="0" cy="0"/>
+        </a:xfrm>
+      </p:grpSpPr>
+      <p:pic>
+        <p:nvPicPr>
+          <p:cNvPr id="5" name="Picture 4" descr="Chart, treemap chart&#10;&#10;Description automatically generated">
+            <a:extLst>
+              <a:ext uri="{FF2B5EF4-FFF2-40B4-BE49-F238E27FC236}">
+                <a16:creationId xmlns:a16="http://schemas.microsoft.com/office/drawing/2014/main" id="{7956547C-5E06-104B-B483-C5C3DE3FCC62}"/>
+              </a:ext>
+            </a:extLst>
+          </p:cNvPr>
+          <p:cNvPicPr>
+            <a:picLocks noChangeAspect="1"/>
+          </p:cNvPicPr>
+          <p:nvPr/>
+        </p:nvPicPr>
+        <p:blipFill>
+          <a:blip r:embed="rId2"/>
+          <a:stretch>
+            <a:fillRect/>
+          </a:stretch>
+        </p:blipFill>
+        <p:spPr>
+          <a:xfrm>
+            <a:off x="1290501" y="0"/>
+            <a:ext cx="9610997" cy="6858000"/>
+          </a:xfrm>
+          <a:prstGeom prst="rect">
+            <a:avLst/>
+          </a:prstGeom>
+        </p:spPr>
+      </p:pic>
+      <p:pic>
+        <p:nvPicPr>
+          <p:cNvPr id="7" name="Picture 6" descr="Table&#10;&#10;Description automatically generated">
+            <a:extLst>
+              <a:ext uri="{FF2B5EF4-FFF2-40B4-BE49-F238E27FC236}">
+                <a16:creationId xmlns:a16="http://schemas.microsoft.com/office/drawing/2014/main" id="{D7F56CF8-7AE0-9F4A-A3FB-B05DA4004E9A}"/>
+              </a:ext>
+            </a:extLst>
+          </p:cNvPr>
+          <p:cNvPicPr>
+            <a:picLocks noChangeAspect="1"/>
+          </p:cNvPicPr>
+          <p:nvPr/>
+        </p:nvPicPr>
+        <p:blipFill>
+          <a:blip r:embed="rId3"/>
+          <a:stretch>
+            <a:fillRect/>
+          </a:stretch>
+        </p:blipFill>
+        <p:spPr>
+          <a:xfrm>
+            <a:off x="1290501" y="0"/>
+            <a:ext cx="9610997" cy="6858000"/>
+          </a:xfrm>
+          <a:prstGeom prst="rect">
+            <a:avLst/>
+          </a:prstGeom>
+        </p:spPr>
+      </p:pic>
+      <p:pic>
+        <p:nvPicPr>
+          <p:cNvPr id="9" name="Picture 8" descr="Chart, treemap chart&#10;&#10;Description automatically generated">
+            <a:extLst>
+              <a:ext uri="{FF2B5EF4-FFF2-40B4-BE49-F238E27FC236}">
+                <a16:creationId xmlns:a16="http://schemas.microsoft.com/office/drawing/2014/main" id="{EC32C42F-C372-EC42-B19C-0DAD026CBBAF}"/>
+              </a:ext>
+            </a:extLst>
+          </p:cNvPr>
+          <p:cNvPicPr>
+            <a:picLocks noChangeAspect="1"/>
+          </p:cNvPicPr>
+          <p:nvPr/>
+        </p:nvPicPr>
+        <p:blipFill>
+          <a:blip r:embed="rId4"/>
+          <a:stretch>
+            <a:fillRect/>
+          </a:stretch>
+        </p:blipFill>
+        <p:spPr>
+          <a:xfrm>
+            <a:off x="1290501" y="0"/>
+            <a:ext cx="9610997" cy="6858000"/>
+          </a:xfrm>
+          <a:prstGeom prst="rect">
+            <a:avLst/>
+          </a:prstGeom>
+        </p:spPr>
+      </p:pic>
+      <p:pic>
+        <p:nvPicPr>
+          <p:cNvPr id="11" name="Picture 10" descr="Table&#10;&#10;Description automatically generated">
+            <a:extLst>
+              <a:ext uri="{FF2B5EF4-FFF2-40B4-BE49-F238E27FC236}">
+                <a16:creationId xmlns:a16="http://schemas.microsoft.com/office/drawing/2014/main" id="{896110A1-ECD7-1F4C-BA4D-2FB51265BDAB}"/>
+              </a:ext>
+            </a:extLst>
+          </p:cNvPr>
+          <p:cNvPicPr>
+            <a:picLocks noChangeAspect="1"/>
+          </p:cNvPicPr>
+          <p:nvPr/>
+        </p:nvPicPr>
+        <p:blipFill>
+          <a:blip r:embed="rId5"/>
+          <a:stretch>
+            <a:fillRect/>
+          </a:stretch>
+        </p:blipFill>
+        <p:spPr>
+          <a:xfrm>
+            <a:off x="1290501" y="0"/>
+            <a:ext cx="9610997" cy="6858000"/>
+          </a:xfrm>
+          <a:prstGeom prst="rect">
+            <a:avLst/>
+          </a:prstGeom>
+        </p:spPr>
+      </p:pic>
+      <p:pic>
+        <p:nvPicPr>
+          <p:cNvPr id="13" name="Picture 12" descr="Table&#10;&#10;Description automatically generated">
+            <a:extLst>
+              <a:ext uri="{FF2B5EF4-FFF2-40B4-BE49-F238E27FC236}">
+                <a16:creationId xmlns:a16="http://schemas.microsoft.com/office/drawing/2014/main" id="{2F8233C4-0DA4-9F4D-81E1-C9E7F0E331B4}"/>
+              </a:ext>
+            </a:extLst>
+          </p:cNvPr>
+          <p:cNvPicPr>
+            <a:picLocks noChangeAspect="1"/>
+          </p:cNvPicPr>
+          <p:nvPr/>
+        </p:nvPicPr>
+        <p:blipFill>
+          <a:blip r:embed="rId6"/>
+          <a:stretch>
+            <a:fillRect/>
+          </a:stretch>
+        </p:blipFill>
+        <p:spPr>
+          <a:xfrm>
+            <a:off x="1290501" y="0"/>
+            <a:ext cx="9610997" cy="6858000"/>
+          </a:xfrm>
+          <a:prstGeom prst="rect">
+            <a:avLst/>
+          </a:prstGeom>
+        </p:spPr>
+      </p:pic>
+      <p:sp>
+        <p:nvSpPr>
+          <p:cNvPr id="14" name="TextBox 13">
+            <a:extLst>
+              <a:ext uri="{FF2B5EF4-FFF2-40B4-BE49-F238E27FC236}">
+                <a16:creationId xmlns:a16="http://schemas.microsoft.com/office/drawing/2014/main" id="{C0DA6E22-CC94-FB48-86CA-9B77C6622753}"/>
+              </a:ext>
+            </a:extLst>
+          </p:cNvPr>
+          <p:cNvSpPr txBox="1"/>
+          <p:nvPr/>
+        </p:nvSpPr>
+        <p:spPr>
+          <a:xfrm>
+            <a:off x="2588964" y="121186"/>
+            <a:ext cx="7755875" cy="369332"/>
+          </a:xfrm>
+          <a:prstGeom prst="rect">
+            <a:avLst/>
+          </a:prstGeom>
+          <a:noFill/>
+        </p:spPr>
+        <p:txBody>
+          <a:bodyPr wrap="square" rtlCol="0">
+            <a:spAutoFit/>
+          </a:bodyPr>
+          <a:lstStyle/>
+          <a:p>
+            <a:r>
+              <a:rPr lang="en-US" dirty="0"/>
+              <a:t>InvertedPendulum-V2 Jerk</a:t>
+            </a:r>
+          </a:p>
+        </p:txBody>
+      </p:sp>
+    </p:spTree>
+    <p:extLst>
+      <p:ext uri="{BB962C8B-B14F-4D97-AF65-F5344CB8AC3E}">
+        <p14:creationId xmlns:p14="http://schemas.microsoft.com/office/powerpoint/2010/main" val="3093038626"/>
+      </p:ext>
+    </p:extLst>
+  </p:cSld>
+  <p:clrMapOvr>
+    <a:masterClrMapping/>
+  </p:clrMapOvr>
+</p:sld>
+</file>
+
+<file path=ppt/slides/slide25.xml><?xml version="1.0" encoding="utf-8"?>
+<p:sld xmlns:a="http://schemas.openxmlformats.org/drawingml/2006/main" xmlns:r="http://schemas.openxmlformats.org/officeDocument/2006/relationships" xmlns:p="http://schemas.openxmlformats.org/presentationml/2006/main">
+  <p:cSld>
+    <p:spTree>
+      <p:nvGrpSpPr>
+        <p:cNvPr id="1" name=""/>
+        <p:cNvGrpSpPr/>
+        <p:nvPr/>
+      </p:nvGrpSpPr>
+      <p:grpSpPr>
+        <a:xfrm>
+          <a:off x="0" y="0"/>
+          <a:ext cx="0" cy="0"/>
+          <a:chOff x="0" y="0"/>
+          <a:chExt cx="0" cy="0"/>
+        </a:xfrm>
+      </p:grpSpPr>
+      <p:pic>
+        <p:nvPicPr>
+          <p:cNvPr id="5" name="Picture 4" descr="Chart, treemap chart&#10;&#10;Description automatically generated">
+            <a:extLst>
+              <a:ext uri="{FF2B5EF4-FFF2-40B4-BE49-F238E27FC236}">
+                <a16:creationId xmlns:a16="http://schemas.microsoft.com/office/drawing/2014/main" id="{7956547C-5E06-104B-B483-C5C3DE3FCC62}"/>
+              </a:ext>
+            </a:extLst>
+          </p:cNvPr>
+          <p:cNvPicPr>
+            <a:picLocks noChangeAspect="1"/>
+          </p:cNvPicPr>
+          <p:nvPr/>
+        </p:nvPicPr>
+        <p:blipFill>
+          <a:blip r:embed="rId2"/>
+          <a:stretch>
+            <a:fillRect/>
+          </a:stretch>
+        </p:blipFill>
+        <p:spPr>
+          <a:xfrm>
+            <a:off x="1290501" y="0"/>
+            <a:ext cx="9610997" cy="6858000"/>
+          </a:xfrm>
+          <a:prstGeom prst="rect">
+            <a:avLst/>
+          </a:prstGeom>
+        </p:spPr>
+      </p:pic>
+      <p:pic>
+        <p:nvPicPr>
+          <p:cNvPr id="7" name="Picture 6" descr="Table&#10;&#10;Description automatically generated">
+            <a:extLst>
+              <a:ext uri="{FF2B5EF4-FFF2-40B4-BE49-F238E27FC236}">
+                <a16:creationId xmlns:a16="http://schemas.microsoft.com/office/drawing/2014/main" id="{D7F56CF8-7AE0-9F4A-A3FB-B05DA4004E9A}"/>
+              </a:ext>
+            </a:extLst>
+          </p:cNvPr>
+          <p:cNvPicPr>
+            <a:picLocks noChangeAspect="1"/>
+          </p:cNvPicPr>
+          <p:nvPr/>
+        </p:nvPicPr>
+        <p:blipFill>
+          <a:blip r:embed="rId3"/>
+          <a:stretch>
+            <a:fillRect/>
+          </a:stretch>
+        </p:blipFill>
+        <p:spPr>
+          <a:xfrm>
+            <a:off x="1290501" y="0"/>
+            <a:ext cx="9610997" cy="6858000"/>
+          </a:xfrm>
+          <a:prstGeom prst="rect">
+            <a:avLst/>
+          </a:prstGeom>
+        </p:spPr>
+      </p:pic>
+      <p:pic>
+        <p:nvPicPr>
+          <p:cNvPr id="9" name="Picture 8" descr="Chart, treemap chart&#10;&#10;Description automatically generated">
+            <a:extLst>
+              <a:ext uri="{FF2B5EF4-FFF2-40B4-BE49-F238E27FC236}">
+                <a16:creationId xmlns:a16="http://schemas.microsoft.com/office/drawing/2014/main" id="{EC32C42F-C372-EC42-B19C-0DAD026CBBAF}"/>
+              </a:ext>
+            </a:extLst>
+          </p:cNvPr>
+          <p:cNvPicPr>
+            <a:picLocks noChangeAspect="1"/>
+          </p:cNvPicPr>
+          <p:nvPr/>
+        </p:nvPicPr>
+        <p:blipFill>
+          <a:blip r:embed="rId4"/>
+          <a:stretch>
+            <a:fillRect/>
+          </a:stretch>
+        </p:blipFill>
+        <p:spPr>
+          <a:xfrm>
+            <a:off x="1290501" y="0"/>
+            <a:ext cx="9610997" cy="6858000"/>
+          </a:xfrm>
+          <a:prstGeom prst="rect">
+            <a:avLst/>
+          </a:prstGeom>
+        </p:spPr>
+      </p:pic>
+      <p:sp>
+        <p:nvSpPr>
+          <p:cNvPr id="14" name="TextBox 13">
+            <a:extLst>
+              <a:ext uri="{FF2B5EF4-FFF2-40B4-BE49-F238E27FC236}">
+                <a16:creationId xmlns:a16="http://schemas.microsoft.com/office/drawing/2014/main" id="{C0DA6E22-CC94-FB48-86CA-9B77C6622753}"/>
+              </a:ext>
+            </a:extLst>
+          </p:cNvPr>
+          <p:cNvSpPr txBox="1"/>
+          <p:nvPr/>
+        </p:nvSpPr>
+        <p:spPr>
+          <a:xfrm>
+            <a:off x="2588964" y="121186"/>
+            <a:ext cx="7755875" cy="369332"/>
+          </a:xfrm>
+          <a:prstGeom prst="rect">
+            <a:avLst/>
+          </a:prstGeom>
+          <a:noFill/>
+        </p:spPr>
+        <p:txBody>
+          <a:bodyPr wrap="square" rtlCol="0">
+            <a:spAutoFit/>
+          </a:bodyPr>
+          <a:lstStyle/>
+          <a:p>
+            <a:r>
+              <a:rPr lang="en-US" dirty="0"/>
+              <a:t>InvertedPendulum-V2 Reward / Survival time in seconds</a:t>
+            </a:r>
+          </a:p>
+        </p:txBody>
+      </p:sp>
+    </p:spTree>
+    <p:extLst>
+      <p:ext uri="{BB962C8B-B14F-4D97-AF65-F5344CB8AC3E}">
+        <p14:creationId xmlns:p14="http://schemas.microsoft.com/office/powerpoint/2010/main" val="3941973621"/>
+      </p:ext>
+    </p:extLst>
+  </p:cSld>
+  <p:clrMapOvr>
+    <a:masterClrMapping/>
+  </p:clrMapOvr>
+</p:sld>
+</file>
+
+<file path=ppt/slides/slide26.xml><?xml version="1.0" encoding="utf-8"?>
+<p:sld xmlns:a="http://schemas.openxmlformats.org/drawingml/2006/main" xmlns:r="http://schemas.openxmlformats.org/officeDocument/2006/relationships" xmlns:p="http://schemas.openxmlformats.org/presentationml/2006/main">
+  <p:cSld>
+    <p:spTree>
+      <p:nvGrpSpPr>
+        <p:cNvPr id="1" name=""/>
+        <p:cNvGrpSpPr/>
+        <p:nvPr/>
+      </p:nvGrpSpPr>
+      <p:grpSpPr>
+        <a:xfrm>
+          <a:off x="0" y="0"/>
+          <a:ext cx="0" cy="0"/>
+          <a:chOff x="0" y="0"/>
+          <a:chExt cx="0" cy="0"/>
+        </a:xfrm>
+      </p:grpSpPr>
+      <p:pic>
+        <p:nvPicPr>
+          <p:cNvPr id="5" name="Picture 4" descr="Chart, treemap chart&#10;&#10;Description automatically generated">
+            <a:extLst>
+              <a:ext uri="{FF2B5EF4-FFF2-40B4-BE49-F238E27FC236}">
+                <a16:creationId xmlns:a16="http://schemas.microsoft.com/office/drawing/2014/main" id="{7956547C-5E06-104B-B483-C5C3DE3FCC62}"/>
+              </a:ext>
+            </a:extLst>
+          </p:cNvPr>
+          <p:cNvPicPr>
+            <a:picLocks noChangeAspect="1"/>
+          </p:cNvPicPr>
+          <p:nvPr/>
+        </p:nvPicPr>
+        <p:blipFill>
+          <a:blip r:embed="rId2"/>
+          <a:stretch>
+            <a:fillRect/>
+          </a:stretch>
+        </p:blipFill>
+        <p:spPr>
+          <a:xfrm>
+            <a:off x="1290501" y="0"/>
+            <a:ext cx="9610997" cy="6858000"/>
+          </a:xfrm>
+          <a:prstGeom prst="rect">
+            <a:avLst/>
+          </a:prstGeom>
+        </p:spPr>
+      </p:pic>
+      <p:pic>
+        <p:nvPicPr>
+          <p:cNvPr id="7" name="Picture 6" descr="Table&#10;&#10;Description automatically generated">
+            <a:extLst>
+              <a:ext uri="{FF2B5EF4-FFF2-40B4-BE49-F238E27FC236}">
+                <a16:creationId xmlns:a16="http://schemas.microsoft.com/office/drawing/2014/main" id="{D7F56CF8-7AE0-9F4A-A3FB-B05DA4004E9A}"/>
+              </a:ext>
+            </a:extLst>
+          </p:cNvPr>
+          <p:cNvPicPr>
+            <a:picLocks noChangeAspect="1"/>
+          </p:cNvPicPr>
+          <p:nvPr/>
+        </p:nvPicPr>
+        <p:blipFill>
+          <a:blip r:embed="rId3"/>
+          <a:stretch>
+            <a:fillRect/>
+          </a:stretch>
+        </p:blipFill>
+        <p:spPr>
+          <a:xfrm>
+            <a:off x="1290501" y="0"/>
+            <a:ext cx="9610997" cy="6858000"/>
+          </a:xfrm>
+          <a:prstGeom prst="rect">
+            <a:avLst/>
+          </a:prstGeom>
+        </p:spPr>
+      </p:pic>
+      <p:sp>
+        <p:nvSpPr>
+          <p:cNvPr id="14" name="TextBox 13">
+            <a:extLst>
+              <a:ext uri="{FF2B5EF4-FFF2-40B4-BE49-F238E27FC236}">
+                <a16:creationId xmlns:a16="http://schemas.microsoft.com/office/drawing/2014/main" id="{C0DA6E22-CC94-FB48-86CA-9B77C6622753}"/>
+              </a:ext>
+            </a:extLst>
+          </p:cNvPr>
+          <p:cNvSpPr txBox="1"/>
+          <p:nvPr/>
+        </p:nvSpPr>
+        <p:spPr>
+          <a:xfrm>
+            <a:off x="2588964" y="121186"/>
+            <a:ext cx="7755875" cy="369332"/>
+          </a:xfrm>
+          <a:prstGeom prst="rect">
+            <a:avLst/>
+          </a:prstGeom>
+          <a:noFill/>
+        </p:spPr>
+        <p:txBody>
+          <a:bodyPr wrap="square" rtlCol="0">
+            <a:spAutoFit/>
+          </a:bodyPr>
+          <a:lstStyle/>
+          <a:p>
+            <a:r>
+              <a:rPr lang="en-US" dirty="0"/>
+              <a:t>HalfCheetah-V2 Reward</a:t>
+            </a:r>
+          </a:p>
+        </p:txBody>
+      </p:sp>
+    </p:spTree>
+    <p:extLst>
+      <p:ext uri="{BB962C8B-B14F-4D97-AF65-F5344CB8AC3E}">
+        <p14:creationId xmlns:p14="http://schemas.microsoft.com/office/powerpoint/2010/main" val="164828142"/>
+      </p:ext>
+    </p:extLst>
+  </p:cSld>
+  <p:clrMapOvr>
+    <a:masterClrMapping/>
+  </p:clrMapOvr>
+</p:sld>
+</file>
+
+<file path=ppt/slides/slide27.xml><?xml version="1.0" encoding="utf-8"?>
+<p:sld xmlns:a="http://schemas.openxmlformats.org/drawingml/2006/main" xmlns:r="http://schemas.openxmlformats.org/officeDocument/2006/relationships" xmlns:p="http://schemas.openxmlformats.org/presentationml/2006/main">
+  <p:cSld>
+    <p:spTree>
+      <p:nvGrpSpPr>
+        <p:cNvPr id="1" name=""/>
+        <p:cNvGrpSpPr/>
+        <p:nvPr/>
+      </p:nvGrpSpPr>
+      <p:grpSpPr>
+        <a:xfrm>
+          <a:off x="0" y="0"/>
+          <a:ext cx="0" cy="0"/>
+          <a:chOff x="0" y="0"/>
+          <a:chExt cx="0" cy="0"/>
+        </a:xfrm>
+      </p:grpSpPr>
+      <p:pic>
+        <p:nvPicPr>
+          <p:cNvPr id="5" name="Picture 4" descr="Chart, treemap chart&#10;&#10;Description automatically generated">
+            <a:extLst>
+              <a:ext uri="{FF2B5EF4-FFF2-40B4-BE49-F238E27FC236}">
+                <a16:creationId xmlns:a16="http://schemas.microsoft.com/office/drawing/2014/main" id="{7956547C-5E06-104B-B483-C5C3DE3FCC62}"/>
+              </a:ext>
+            </a:extLst>
+          </p:cNvPr>
+          <p:cNvPicPr>
+            <a:picLocks noChangeAspect="1"/>
+          </p:cNvPicPr>
+          <p:nvPr/>
+        </p:nvPicPr>
+        <p:blipFill>
+          <a:blip r:embed="rId2"/>
+          <a:stretch>
+            <a:fillRect/>
+          </a:stretch>
+        </p:blipFill>
+        <p:spPr>
+          <a:xfrm>
+            <a:off x="1290501" y="0"/>
+            <a:ext cx="9610997" cy="6858000"/>
+          </a:xfrm>
+          <a:prstGeom prst="rect">
+            <a:avLst/>
+          </a:prstGeom>
+        </p:spPr>
+      </p:pic>
+      <p:sp>
+        <p:nvSpPr>
+          <p:cNvPr id="14" name="TextBox 13">
+            <a:extLst>
+              <a:ext uri="{FF2B5EF4-FFF2-40B4-BE49-F238E27FC236}">
+                <a16:creationId xmlns:a16="http://schemas.microsoft.com/office/drawing/2014/main" id="{C0DA6E22-CC94-FB48-86CA-9B77C6622753}"/>
+              </a:ext>
+            </a:extLst>
+          </p:cNvPr>
+          <p:cNvSpPr txBox="1"/>
+          <p:nvPr/>
+        </p:nvSpPr>
+        <p:spPr>
+          <a:xfrm>
+            <a:off x="2588964" y="121186"/>
+            <a:ext cx="7755875" cy="369332"/>
+          </a:xfrm>
+          <a:prstGeom prst="rect">
+            <a:avLst/>
+          </a:prstGeom>
+          <a:noFill/>
+        </p:spPr>
+        <p:txBody>
+          <a:bodyPr wrap="square" rtlCol="0">
+            <a:spAutoFit/>
+          </a:bodyPr>
+          <a:lstStyle/>
+          <a:p>
+            <a:r>
+              <a:rPr lang="en-US" dirty="0"/>
+              <a:t>HalfCheetah-V2 Reward</a:t>
+            </a:r>
+          </a:p>
+        </p:txBody>
+      </p:sp>
+    </p:spTree>
+    <p:extLst>
+      <p:ext uri="{BB962C8B-B14F-4D97-AF65-F5344CB8AC3E}">
+        <p14:creationId xmlns:p14="http://schemas.microsoft.com/office/powerpoint/2010/main" val="1857654829"/>
+      </p:ext>
+    </p:extLst>
+  </p:cSld>
+  <p:clrMapOvr>
+    <a:masterClrMapping/>
+  </p:clrMapOvr>
+</p:sld>
+</file>
+
 <file path=ppt/slides/slide3.xml><?xml version="1.0" encoding="utf-8"?>
 <p:sld xmlns:a="http://schemas.openxmlformats.org/drawingml/2006/main" xmlns:r="http://schemas.openxmlformats.org/officeDocument/2006/relationships" xmlns:p="http://schemas.openxmlformats.org/presentationml/2006/main">
   <p:cSld>
@@ -10015,7 +10795,7 @@
                   <a:schemeClr val="bg1"/>
                 </a:solidFill>
               </a:rPr>
-              <a:t>IntertedPendulum-v2</a:t>
+              <a:t>InvertedPendulum-v2</a:t>
             </a:r>
           </a:p>
         </p:txBody>

</xml_diff>